<commit_message>
finsihed chapter one of docs
</commit_message>
<xml_diff>
--- a/Documentation/Slides/Mobile Application for Personal Diabetes Management.pptx
+++ b/Documentation/Slides/Mobile Application for Personal Diabetes Management.pptx
@@ -317,7 +317,7 @@
           <a:p>
             <a:fld id="{12E1AC0E-08FB-4712-B40A-6DEDD1A26123}" type="datetimeFigureOut">
               <a:rPr lang="en-US" smtClean="0"/>
-              <a:t>4/4/2019</a:t>
+              <a:t>4/24/2019</a:t>
             </a:fld>
             <a:endParaRPr lang="en-US"/>
           </a:p>
@@ -655,7 +655,7 @@
           <a:p>
             <a:fld id="{12E1AC0E-08FB-4712-B40A-6DEDD1A26123}" type="datetimeFigureOut">
               <a:rPr lang="en-US" smtClean="0"/>
-              <a:t>4/4/2019</a:t>
+              <a:t>4/24/2019</a:t>
             </a:fld>
             <a:endParaRPr lang="en-US"/>
           </a:p>
@@ -1056,7 +1056,7 @@
           <a:p>
             <a:fld id="{12E1AC0E-08FB-4712-B40A-6DEDD1A26123}" type="datetimeFigureOut">
               <a:rPr lang="en-US" smtClean="0"/>
-              <a:t>4/4/2019</a:t>
+              <a:t>4/24/2019</a:t>
             </a:fld>
             <a:endParaRPr lang="en-US"/>
           </a:p>
@@ -1392,7 +1392,7 @@
           <a:p>
             <a:fld id="{12E1AC0E-08FB-4712-B40A-6DEDD1A26123}" type="datetimeFigureOut">
               <a:rPr lang="en-US" smtClean="0"/>
-              <a:t>4/4/2019</a:t>
+              <a:t>4/24/2019</a:t>
             </a:fld>
             <a:endParaRPr lang="en-US"/>
           </a:p>
@@ -1712,7 +1712,7 @@
           <a:p>
             <a:fld id="{12E1AC0E-08FB-4712-B40A-6DEDD1A26123}" type="datetimeFigureOut">
               <a:rPr lang="en-US" smtClean="0"/>
-              <a:t>4/4/2019</a:t>
+              <a:t>4/24/2019</a:t>
             </a:fld>
             <a:endParaRPr lang="en-US"/>
           </a:p>
@@ -2108,7 +2108,7 @@
           <a:p>
             <a:fld id="{12E1AC0E-08FB-4712-B40A-6DEDD1A26123}" type="datetimeFigureOut">
               <a:rPr lang="en-US" smtClean="0"/>
-              <a:t>4/4/2019</a:t>
+              <a:t>4/24/2019</a:t>
             </a:fld>
             <a:endParaRPr lang="en-US"/>
           </a:p>
@@ -2365,7 +2365,7 @@
           <a:p>
             <a:fld id="{12E1AC0E-08FB-4712-B40A-6DEDD1A26123}" type="datetimeFigureOut">
               <a:rPr lang="en-US" smtClean="0"/>
-              <a:t>4/4/2019</a:t>
+              <a:t>4/24/2019</a:t>
             </a:fld>
             <a:endParaRPr lang="en-US"/>
           </a:p>
@@ -2627,7 +2627,7 @@
           <a:p>
             <a:fld id="{12E1AC0E-08FB-4712-B40A-6DEDD1A26123}" type="datetimeFigureOut">
               <a:rPr lang="en-US" smtClean="0"/>
-              <a:t>4/4/2019</a:t>
+              <a:t>4/24/2019</a:t>
             </a:fld>
             <a:endParaRPr lang="en-US"/>
           </a:p>
@@ -2889,7 +2889,7 @@
           <a:p>
             <a:fld id="{12E1AC0E-08FB-4712-B40A-6DEDD1A26123}" type="datetimeFigureOut">
               <a:rPr lang="en-US" smtClean="0"/>
-              <a:t>4/4/2019</a:t>
+              <a:t>4/24/2019</a:t>
             </a:fld>
             <a:endParaRPr lang="en-US"/>
           </a:p>
@@ -3218,7 +3218,7 @@
           <a:p>
             <a:fld id="{12E1AC0E-08FB-4712-B40A-6DEDD1A26123}" type="datetimeFigureOut">
               <a:rPr lang="en-US" smtClean="0"/>
-              <a:t>4/4/2019</a:t>
+              <a:t>4/24/2019</a:t>
             </a:fld>
             <a:endParaRPr lang="en-US"/>
           </a:p>
@@ -3541,7 +3541,7 @@
           <a:p>
             <a:fld id="{12E1AC0E-08FB-4712-B40A-6DEDD1A26123}" type="datetimeFigureOut">
               <a:rPr lang="en-US" smtClean="0"/>
-              <a:t>4/4/2019</a:t>
+              <a:t>4/24/2019</a:t>
             </a:fld>
             <a:endParaRPr lang="en-US"/>
           </a:p>
@@ -3998,7 +3998,7 @@
           <a:p>
             <a:fld id="{12E1AC0E-08FB-4712-B40A-6DEDD1A26123}" type="datetimeFigureOut">
               <a:rPr lang="en-US" smtClean="0"/>
-              <a:t>4/4/2019</a:t>
+              <a:t>4/24/2019</a:t>
             </a:fld>
             <a:endParaRPr lang="en-US"/>
           </a:p>
@@ -4203,7 +4203,7 @@
           <a:p>
             <a:fld id="{12E1AC0E-08FB-4712-B40A-6DEDD1A26123}" type="datetimeFigureOut">
               <a:rPr lang="en-US" smtClean="0"/>
-              <a:t>4/4/2019</a:t>
+              <a:t>4/24/2019</a:t>
             </a:fld>
             <a:endParaRPr lang="en-US"/>
           </a:p>
@@ -4380,7 +4380,7 @@
           <a:p>
             <a:fld id="{12E1AC0E-08FB-4712-B40A-6DEDD1A26123}" type="datetimeFigureOut">
               <a:rPr lang="en-US" smtClean="0"/>
-              <a:t>4/4/2019</a:t>
+              <a:t>4/24/2019</a:t>
             </a:fld>
             <a:endParaRPr lang="en-US"/>
           </a:p>
@@ -4713,7 +4713,7 @@
           <a:p>
             <a:fld id="{12E1AC0E-08FB-4712-B40A-6DEDD1A26123}" type="datetimeFigureOut">
               <a:rPr lang="en-US" smtClean="0"/>
-              <a:t>4/4/2019</a:t>
+              <a:t>4/24/2019</a:t>
             </a:fld>
             <a:endParaRPr lang="en-US"/>
           </a:p>
@@ -5058,7 +5058,7 @@
           <a:p>
             <a:fld id="{12E1AC0E-08FB-4712-B40A-6DEDD1A26123}" type="datetimeFigureOut">
               <a:rPr lang="en-US" smtClean="0"/>
-              <a:t>4/4/2019</a:t>
+              <a:t>4/24/2019</a:t>
             </a:fld>
             <a:endParaRPr lang="en-US"/>
           </a:p>
@@ -7175,7 +7175,7 @@
           <a:p>
             <a:fld id="{12E1AC0E-08FB-4712-B40A-6DEDD1A26123}" type="datetimeFigureOut">
               <a:rPr lang="en-US" smtClean="0"/>
-              <a:t>4/4/2019</a:t>
+              <a:t>4/24/2019</a:t>
             </a:fld>
             <a:endParaRPr lang="en-US"/>
           </a:p>
@@ -7732,7 +7732,15 @@
             </a:br>
             <a:r>
               <a:rPr lang="en-US" sz="1600" dirty="0" smtClean="0"/>
-              <a:t>Cyprian Ampong Boateng – 10580360</a:t>
+              <a:t>Cyprian Ampong Boateng </a:t>
+            </a:r>
+            <a:r>
+              <a:rPr lang="en-US" sz="1600" dirty="0" smtClean="0"/>
+              <a:t>-10580360</a:t>
+            </a:r>
+            <a:r>
+              <a:rPr lang="en-US" sz="1600" dirty="0" smtClean="0"/>
+              <a:t/>
             </a:r>
             <a:br>
               <a:rPr lang="en-US" sz="1600" dirty="0" smtClean="0"/>
@@ -7751,7 +7759,11 @@
             </a:r>
             <a:r>
               <a:rPr lang="en-US" sz="1600" dirty="0" smtClean="0"/>
-              <a:t> - 10576182 </a:t>
+              <a:t> </a:t>
+            </a:r>
+            <a:r>
+              <a:rPr lang="en-US" sz="1600" dirty="0" smtClean="0"/>
+              <a:t>-10576182 </a:t>
             </a:r>
             <a:endParaRPr lang="en-US" sz="1600" dirty="0"/>
           </a:p>
@@ -8871,23 +8883,7 @@
                   <a:schemeClr val="tx1"/>
                 </a:solidFill>
               </a:rPr>
-              <a:t>Easy </a:t>
-            </a:r>
-            <a:r>
-              <a:rPr lang="en-US" sz="3200" dirty="0" smtClean="0">
-                <a:solidFill>
-                  <a:schemeClr val="tx1"/>
-                </a:solidFill>
-              </a:rPr>
-              <a:t>tracking of diabetes </a:t>
-            </a:r>
-            <a:r>
-              <a:rPr lang="en-US" sz="3200" dirty="0" smtClean="0">
-                <a:solidFill>
-                  <a:schemeClr val="tx1"/>
-                </a:solidFill>
-              </a:rPr>
-              <a:t>progress</a:t>
+              <a:t>Easy tracking of diabetes progress</a:t>
             </a:r>
           </a:p>
           <a:p>
@@ -9053,11 +9049,6 @@
               </a:rPr>
               <a:t> </a:t>
             </a:r>
-            <a:endParaRPr lang="en-US" sz="3200" dirty="0" smtClean="0">
-              <a:solidFill>
-                <a:schemeClr val="tx1"/>
-              </a:solidFill>
-            </a:endParaRPr>
           </a:p>
           <a:p>
             <a:r>
@@ -9094,23 +9085,7 @@
                   <a:schemeClr val="tx1"/>
                 </a:solidFill>
               </a:rPr>
-              <a:t>se </a:t>
-            </a:r>
-            <a:r>
-              <a:rPr lang="en-US" sz="2400" dirty="0" smtClean="0">
-                <a:solidFill>
-                  <a:schemeClr val="tx1"/>
-                </a:solidFill>
-              </a:rPr>
-              <a:t>self explanatory and flexible charts to display patient’s medical records(blood sugar level, blood pressure, weight etc</a:t>
-            </a:r>
-            <a:r>
-              <a:rPr lang="en-US" sz="2400" dirty="0" smtClean="0">
-                <a:solidFill>
-                  <a:schemeClr val="tx1"/>
-                </a:solidFill>
-              </a:rPr>
-              <a:t>.)</a:t>
+              <a:t>se self explanatory and flexible charts to display patient’s medical records(blood sugar level, blood pressure, weight etc.)</a:t>
             </a:r>
           </a:p>
           <a:p>

</xml_diff>